<commit_message>
update course intro slides and resource links at course webpage
</commit_message>
<xml_diff>
--- a/Labs/Lab00-course_intro/lab00-course_info.pptx
+++ b/Labs/Lab00-course_intro/lab00-course_info.pptx
@@ -8766,27 +8766,43 @@
           <a:p>
             <a:pPr lvl="1" eaLnBrk="1" hangingPunct="1"/>
             <a:r>
+              <a:rPr lang="en-US" altLang="zh-TW" sz="2000" dirty="0">
+                <a:hlinkClick r:id="rId3"/>
+              </a:rPr>
+              <a:t>https://</a:t>
+            </a:r>
+            <a:r>
               <a:rPr lang="en-US" altLang="zh-TW" sz="2000" dirty="0" smtClean="0">
                 <a:hlinkClick r:id="rId3"/>
               </a:rPr>
-              <a:t>http://www.silabs.com/products/mcu/mixed-signalmcu/Pages/C8051F04x.aspx</a:t>
+              <a:t>www.silabs.com/documents/public/data-sheets/C8051F04x.pdf</a:t>
             </a:r>
             <a:endParaRPr lang="en-US" altLang="zh-TW" sz="2000" dirty="0" smtClean="0"/>
           </a:p>
           <a:p>
             <a:pPr eaLnBrk="1" hangingPunct="1"/>
             <a:r>
-              <a:rPr lang="en-US" altLang="zh-TW" sz="2400" dirty="0" smtClean="0"/>
-              <a:t>Big8051 schematic</a:t>
+              <a:rPr lang="en-US" altLang="zh-TW" dirty="0" smtClean="0"/>
+              <a:t>Big8051 </a:t>
+            </a:r>
+            <a:r>
+              <a:rPr lang="en-US" altLang="zh-TW" dirty="0" smtClean="0"/>
+              <a:t>schematic</a:t>
             </a:r>
           </a:p>
           <a:p>
             <a:pPr lvl="1" eaLnBrk="1" hangingPunct="1"/>
+            <a:r>
+              <a:rPr lang="en-US" altLang="zh-TW" sz="2000" dirty="0">
+                <a:hlinkClick r:id="rId4"/>
+              </a:rPr>
+              <a:t>https://</a:t>
+            </a:r>
             <a:r>
               <a:rPr lang="en-US" altLang="zh-TW" sz="2000" dirty="0" smtClean="0">
                 <a:hlinkClick r:id="rId4"/>
               </a:rPr>
-              <a:t>http://www.mikroe.com/downloads/get/1461/big8051_schematic_v100.pdf</a:t>
+              <a:t>download.mikroe.com/documents/full-featured-boards/easy/big8051-v6/big8051-manual-v100.pdf</a:t>
             </a:r>
             <a:r>
               <a:rPr lang="en-US" altLang="zh-TW" sz="2000" dirty="0" smtClean="0"/>
@@ -8944,10 +8960,10 @@
           <a:p>
             <a:pPr eaLnBrk="1" hangingPunct="1"/>
             <a:r>
-              <a:rPr lang="en-US" altLang="zh-TW" smtClean="0"/>
+              <a:rPr lang="en-US" altLang="zh-TW" dirty="0" smtClean="0"/>
               <a:t>Where to get course materials</a:t>
             </a:r>
-            <a:endParaRPr lang="zh-TW" altLang="en-US" smtClean="0"/>
+            <a:endParaRPr lang="zh-TW" altLang="en-US" dirty="0" smtClean="0"/>
           </a:p>
         </p:txBody>
       </p:sp>
@@ -8976,6 +8992,22 @@
           </a:p>
           <a:p>
             <a:pPr eaLnBrk="1" hangingPunct="1"/>
+            <a:r>
+              <a:rPr lang="en-US" altLang="zh-TW" sz="2400" dirty="0">
+                <a:hlinkClick r:id="rId2"/>
+              </a:rPr>
+              <a:t>https://</a:t>
+            </a:r>
+            <a:r>
+              <a:rPr lang="en-US" altLang="zh-TW" sz="2400" dirty="0" smtClean="0">
+                <a:hlinkClick r:id="rId2"/>
+              </a:rPr>
+              <a:t>github.com/CGUSystemCourses/Micro_Lab-2017</a:t>
+            </a:r>
+            <a:r>
+              <a:rPr lang="en-US" altLang="zh-TW" sz="2400" dirty="0" smtClean="0"/>
+              <a:t> </a:t>
+            </a:r>
             <a:endParaRPr lang="en-US" altLang="zh-TW" sz="2400" dirty="0" smtClean="0"/>
           </a:p>
         </p:txBody>

</xml_diff>